<commit_message>
Update AJP (01ce0502) - Unit 6 - Hibernate 02 (HQL).pptx
</commit_message>
<xml_diff>
--- a/AJP Slides/AJP (01ce0502) - Unit 6 - Hibernate 02 (HQL).pptx
+++ b/AJP Slides/AJP (01ce0502) - Unit 6 - Hibernate 02 (HQL).pptx
@@ -61,6 +61,9 @@
   </p:sldIdLst>
   <p:sldSz cx="12192000" cy="6858000"/>
   <p:notesSz cx="6858000" cy="9144000"/>
+  <p:custDataLst>
+    <p:tags r:id="rId53"/>
+  </p:custDataLst>
   <p:defaultTextStyle>
     <a:defPPr>
       <a:defRPr lang="en-US"/>
@@ -246,7 +249,7 @@
           <a:p>
             <a:fld id="{3EE9B27C-B7CA-4F6C-831C-F687ED3F978F}" type="datetimeFigureOut">
               <a:rPr lang="en-IN" smtClean="0"/>
-              <a:t>08-11-2022</a:t>
+              <a:t>09-11-2022</a:t>
             </a:fld>
             <a:endParaRPr lang="en-IN"/>
           </a:p>
@@ -741,7 +744,7 @@
             <a:fld id="{A2F7FC8D-0053-4C32-9EFC-D87C515146A9}" type="datetimeFigureOut">
               <a:rPr lang="en-IN" smtClean="0"/>
               <a:pPr/>
-              <a:t>08-11-2022</a:t>
+              <a:t>09-11-2022</a:t>
             </a:fld>
             <a:endParaRPr lang="en-IN"/>
           </a:p>
@@ -951,7 +954,7 @@
             <a:fld id="{A2F7FC8D-0053-4C32-9EFC-D87C515146A9}" type="datetimeFigureOut">
               <a:rPr lang="en-IN" smtClean="0"/>
               <a:pPr/>
-              <a:t>08-11-2022</a:t>
+              <a:t>09-11-2022</a:t>
             </a:fld>
             <a:endParaRPr lang="en-IN"/>
           </a:p>
@@ -1209,7 +1212,7 @@
             <a:fld id="{A2F7FC8D-0053-4C32-9EFC-D87C515146A9}" type="datetimeFigureOut">
               <a:rPr lang="en-IN" smtClean="0"/>
               <a:pPr/>
-              <a:t>08-11-2022</a:t>
+              <a:t>09-11-2022</a:t>
             </a:fld>
             <a:endParaRPr lang="en-IN"/>
           </a:p>
@@ -1502,7 +1505,7 @@
           <a:p>
             <a:fld id="{6FB43858-62DF-46DC-A722-16DDCB33C490}" type="datetime1">
               <a:rPr lang="en-IN" smtClean="0"/>
-              <a:t>08-11-2022</a:t>
+              <a:t>09-11-2022</a:t>
             </a:fld>
             <a:endParaRPr lang="en-IN"/>
           </a:p>
@@ -1601,7 +1604,7 @@
           <a:p>
             <a:fld id="{3FE80B3F-EDF7-462F-9E06-D6C20DAA4D71}" type="datetime1">
               <a:rPr lang="en-IN" smtClean="0"/>
-              <a:t>08-11-2022</a:t>
+              <a:t>09-11-2022</a:t>
             </a:fld>
             <a:endParaRPr lang="en-IN"/>
           </a:p>
@@ -1964,7 +1967,7 @@
           <a:p>
             <a:fld id="{DBEEA69D-FA15-4240-AF1E-5D13FC927A7B}" type="datetime1">
               <a:rPr lang="en-IN" smtClean="0"/>
-              <a:t>08-11-2022</a:t>
+              <a:t>09-11-2022</a:t>
             </a:fld>
             <a:endParaRPr lang="en-IN"/>
           </a:p>
@@ -2270,7 +2273,7 @@
           <a:p>
             <a:fld id="{2F5C3E3D-430E-4E46-B0D7-7E12E2B4397F}" type="datetime1">
               <a:rPr lang="en-IN" smtClean="0"/>
-              <a:t>08-11-2022</a:t>
+              <a:t>09-11-2022</a:t>
             </a:fld>
             <a:endParaRPr lang="en-IN"/>
           </a:p>
@@ -2736,7 +2739,7 @@
           <a:p>
             <a:fld id="{6F418E1B-4234-4B2A-8189-9EF7DF0BEF8D}" type="datetime1">
               <a:rPr lang="en-IN" smtClean="0"/>
-              <a:t>08-11-2022</a:t>
+              <a:t>09-11-2022</a:t>
             </a:fld>
             <a:endParaRPr lang="en-IN"/>
           </a:p>
@@ -2832,7 +2835,7 @@
           <a:p>
             <a:fld id="{F05243D8-9329-481D-8DB6-A2959CDE47BC}" type="datetime1">
               <a:rPr lang="en-IN" smtClean="0"/>
-              <a:t>08-11-2022</a:t>
+              <a:t>09-11-2022</a:t>
             </a:fld>
             <a:endParaRPr lang="en-IN"/>
           </a:p>
@@ -2964,7 +2967,7 @@
           <a:p>
             <a:fld id="{28EC2D06-6D04-4FD8-9B44-4275F287AC29}" type="datetime1">
               <a:rPr lang="en-IN" smtClean="0"/>
-              <a:t>08-11-2022</a:t>
+              <a:t>09-11-2022</a:t>
             </a:fld>
             <a:endParaRPr lang="en-IN"/>
           </a:p>
@@ -3265,7 +3268,7 @@
           <a:p>
             <a:fld id="{B4FD8A8A-12EA-4B93-8209-9A09BD3E31E0}" type="datetime1">
               <a:rPr lang="en-IN" smtClean="0"/>
-              <a:t>08-11-2022</a:t>
+              <a:t>09-11-2022</a:t>
             </a:fld>
             <a:endParaRPr lang="en-IN"/>
           </a:p>
@@ -3437,7 +3440,7 @@
             <a:fld id="{A2F7FC8D-0053-4C32-9EFC-D87C515146A9}" type="datetimeFigureOut">
               <a:rPr lang="en-IN" smtClean="0"/>
               <a:pPr/>
-              <a:t>08-11-2022</a:t>
+              <a:t>09-11-2022</a:t>
             </a:fld>
             <a:endParaRPr lang="en-IN"/>
           </a:p>
@@ -3720,7 +3723,7 @@
           <a:p>
             <a:fld id="{B5AA7520-7936-4190-A0F2-397BC78ADFCA}" type="datetime1">
               <a:rPr lang="en-IN" smtClean="0"/>
-              <a:t>08-11-2022</a:t>
+              <a:t>09-11-2022</a:t>
             </a:fld>
             <a:endParaRPr lang="en-IN"/>
           </a:p>
@@ -3912,7 +3915,7 @@
           <a:p>
             <a:fld id="{27FF9B6A-2120-4BA5-A565-5B7B70FFA542}" type="datetime1">
               <a:rPr lang="en-IN" smtClean="0"/>
-              <a:t>08-11-2022</a:t>
+              <a:t>09-11-2022</a:t>
             </a:fld>
             <a:endParaRPr lang="en-IN"/>
           </a:p>
@@ -4102,7 +4105,7 @@
           <a:p>
             <a:fld id="{C8CEAC51-91A0-4953-AB98-8E5F4BCF012C}" type="datetime1">
               <a:rPr lang="en-IN" smtClean="0"/>
-              <a:t>08-11-2022</a:t>
+              <a:t>09-11-2022</a:t>
             </a:fld>
             <a:endParaRPr lang="en-IN"/>
           </a:p>
@@ -4276,7 +4279,7 @@
           <a:p>
             <a:fld id="{F928F5A0-629C-4B3B-BA04-282CC6E8CFC0}" type="datetime1">
               <a:rPr lang="en-IN" smtClean="0"/>
-              <a:t>08-11-2022</a:t>
+              <a:t>09-11-2022</a:t>
             </a:fld>
             <a:endParaRPr lang="en-US"/>
           </a:p>
@@ -4624,7 +4627,7 @@
             <a:fld id="{A2F7FC8D-0053-4C32-9EFC-D87C515146A9}" type="datetimeFigureOut">
               <a:rPr lang="en-IN" smtClean="0"/>
               <a:pPr/>
-              <a:t>08-11-2022</a:t>
+              <a:t>09-11-2022</a:t>
             </a:fld>
             <a:endParaRPr lang="en-IN"/>
           </a:p>
@@ -4901,7 +4904,7 @@
             <a:fld id="{A2F7FC8D-0053-4C32-9EFC-D87C515146A9}" type="datetimeFigureOut">
               <a:rPr lang="en-IN" smtClean="0"/>
               <a:pPr/>
-              <a:t>08-11-2022</a:t>
+              <a:t>09-11-2022</a:t>
             </a:fld>
             <a:endParaRPr lang="en-IN"/>
           </a:p>
@@ -5282,7 +5285,7 @@
             <a:fld id="{A2F7FC8D-0053-4C32-9EFC-D87C515146A9}" type="datetimeFigureOut">
               <a:rPr lang="en-IN" smtClean="0"/>
               <a:pPr/>
-              <a:t>08-11-2022</a:t>
+              <a:t>09-11-2022</a:t>
             </a:fld>
             <a:endParaRPr lang="en-IN"/>
           </a:p>
@@ -5402,7 +5405,7 @@
             <a:fld id="{A2F7FC8D-0053-4C32-9EFC-D87C515146A9}" type="datetimeFigureOut">
               <a:rPr lang="en-IN" smtClean="0"/>
               <a:pPr/>
-              <a:t>08-11-2022</a:t>
+              <a:t>09-11-2022</a:t>
             </a:fld>
             <a:endParaRPr lang="en-IN"/>
           </a:p>
@@ -5575,7 +5578,7 @@
             <a:fld id="{A2F7FC8D-0053-4C32-9EFC-D87C515146A9}" type="datetimeFigureOut">
               <a:rPr lang="en-IN" smtClean="0"/>
               <a:pPr/>
-              <a:t>08-11-2022</a:t>
+              <a:t>09-11-2022</a:t>
             </a:fld>
             <a:endParaRPr lang="en-IN"/>
           </a:p>
@@ -5931,7 +5934,7 @@
             <a:fld id="{A2F7FC8D-0053-4C32-9EFC-D87C515146A9}" type="datetimeFigureOut">
               <a:rPr lang="en-IN" smtClean="0"/>
               <a:pPr/>
-              <a:t>08-11-2022</a:t>
+              <a:t>09-11-2022</a:t>
             </a:fld>
             <a:endParaRPr lang="en-IN"/>
           </a:p>
@@ -6322,7 +6325,7 @@
             <a:fld id="{A2F7FC8D-0053-4C32-9EFC-D87C515146A9}" type="datetimeFigureOut">
               <a:rPr lang="en-IN" smtClean="0"/>
               <a:pPr/>
-              <a:t>08-11-2022</a:t>
+              <a:t>09-11-2022</a:t>
             </a:fld>
             <a:endParaRPr lang="en-IN"/>
           </a:p>
@@ -6612,7 +6615,7 @@
             <a:fld id="{A2F7FC8D-0053-4C32-9EFC-D87C515146A9}" type="datetimeFigureOut">
               <a:rPr lang="en-IN" smtClean="0"/>
               <a:pPr defTabSz="457200"/>
-              <a:t>08-11-2022</a:t>
+              <a:t>09-11-2022</a:t>
             </a:fld>
             <a:endParaRPr lang="en-IN"/>
           </a:p>
@@ -7220,7 +7223,7 @@
           <a:p>
             <a:fld id="{83130EFF-2AC4-4E35-AF87-375B6FC5FE04}" type="datetime1">
               <a:rPr lang="en-IN" smtClean="0"/>
-              <a:t>08-11-2022</a:t>
+              <a:t>09-11-2022</a:t>
             </a:fld>
             <a:endParaRPr lang="en-IN"/>
           </a:p>
@@ -7801,8 +7804,8 @@
         </p:nvSpPr>
         <p:spPr>
           <a:xfrm>
-            <a:off x="8153401" y="1104186"/>
-            <a:ext cx="4038600" cy="4708981"/>
+            <a:off x="8153401" y="1662406"/>
+            <a:ext cx="4038600" cy="3416320"/>
           </a:xfrm>
           <a:prstGeom prst="rect">
             <a:avLst/>
@@ -8068,104 +8071,6 @@
               <a:ea typeface="Cascadia Code PL SemiBold" pitchFamily="49" charset="0"/>
               <a:cs typeface="Cascadia Code PL SemiBold" pitchFamily="49" charset="0"/>
             </a:endParaRPr>
-          </a:p>
-          <a:p>
-            <a:pPr marL="0" marR="0" lvl="0" indent="0" algn="ctr" defTabSz="457200" rtl="0" eaLnBrk="1" fontAlgn="auto" latinLnBrk="0" hangingPunct="1">
-              <a:lnSpc>
-                <a:spcPct val="100000"/>
-              </a:lnSpc>
-              <a:spcBef>
-                <a:spcPts val="0"/>
-              </a:spcBef>
-              <a:spcAft>
-                <a:spcPts val="0"/>
-              </a:spcAft>
-              <a:buClrTx/>
-              <a:buSzTx/>
-              <a:buFontTx/>
-              <a:buNone/>
-              <a:tabLst/>
-              <a:defRPr/>
-            </a:pPr>
-            <a:r>
-              <a:rPr kumimoji="0" lang="en-IN" sz="2800" b="1" i="0" u="none" strike="noStrike" kern="1200" cap="none" spc="0" normalizeH="0" baseline="0" noProof="0" dirty="0" smtClean="0">
-                <a:ln>
-                  <a:noFill/>
-                </a:ln>
-                <a:solidFill>
-                  <a:prstClr val="black"/>
-                </a:solidFill>
-                <a:effectLst>
-                  <a:outerShdw blurRad="38100" dist="38100" dir="2700000" algn="tl">
-                    <a:srgbClr val="000000">
-                      <a:alpha val="43137"/>
-                    </a:srgbClr>
-                  </a:outerShdw>
-                </a:effectLst>
-                <a:uLnTx/>
-                <a:uFillTx/>
-                <a:latin typeface="Cascadia Code PL SemiBold" pitchFamily="49" charset="0"/>
-                <a:ea typeface="Cascadia Code PL SemiBold" pitchFamily="49" charset="0"/>
-                <a:cs typeface="Cascadia Code PL SemiBold" pitchFamily="49" charset="0"/>
-              </a:rPr>
-              <a:t>SUB-TOPIC: </a:t>
-            </a:r>
-            <a:endParaRPr kumimoji="0" lang="en-IN" sz="2800" b="1" i="0" u="none" strike="noStrike" kern="1200" cap="none" spc="0" normalizeH="0" baseline="0" noProof="0" dirty="0">
-              <a:ln>
-                <a:noFill/>
-              </a:ln>
-              <a:solidFill>
-                <a:prstClr val="black"/>
-              </a:solidFill>
-              <a:effectLst>
-                <a:outerShdw blurRad="38100" dist="38100" dir="2700000" algn="tl">
-                  <a:srgbClr val="000000">
-                    <a:alpha val="43137"/>
-                  </a:srgbClr>
-                </a:outerShdw>
-              </a:effectLst>
-              <a:uLnTx/>
-              <a:uFillTx/>
-              <a:latin typeface="Cascadia Code PL SemiBold" pitchFamily="49" charset="0"/>
-              <a:ea typeface="Cascadia Code PL SemiBold" pitchFamily="49" charset="0"/>
-              <a:cs typeface="Cascadia Code PL SemiBold" pitchFamily="49" charset="0"/>
-            </a:endParaRPr>
-          </a:p>
-          <a:p>
-            <a:pPr marL="0" marR="0" lvl="0" indent="0" algn="ctr" defTabSz="457200" rtl="0" eaLnBrk="1" fontAlgn="auto" latinLnBrk="0" hangingPunct="1">
-              <a:lnSpc>
-                <a:spcPct val="100000"/>
-              </a:lnSpc>
-              <a:spcBef>
-                <a:spcPts val="0"/>
-              </a:spcBef>
-              <a:spcAft>
-                <a:spcPts val="0"/>
-              </a:spcAft>
-              <a:buClrTx/>
-              <a:buSzTx/>
-              <a:buFontTx/>
-              <a:buNone/>
-              <a:tabLst/>
-              <a:defRPr/>
-            </a:pPr>
-            <a:r>
-              <a:rPr kumimoji="0" lang="en-IN" sz="2800" b="0" i="0" u="none" strike="noStrike" kern="1200" cap="none" spc="0" normalizeH="0" baseline="0" noProof="0" dirty="0" smtClean="0">
-                <a:ln>
-                  <a:noFill/>
-                </a:ln>
-                <a:solidFill>
-                  <a:srgbClr val="546276"/>
-                </a:solidFill>
-                <a:effectLst/>
-                <a:uLnTx/>
-                <a:uFillTx/>
-                <a:latin typeface="Cascadia Code PL SemiBold" pitchFamily="49" charset="0"/>
-                <a:ea typeface="Cascadia Code PL SemiBold" pitchFamily="49" charset="0"/>
-                <a:cs typeface="Cascadia Code PL SemiBold" pitchFamily="49" charset="0"/>
-              </a:rPr>
-              <a:t>Hibernate Architecture</a:t>
-            </a:r>
           </a:p>
         </p:txBody>
       </p:sp>
@@ -23564,7 +23469,8 @@
 
 <file path=ppt/tags/tag1.xml><?xml version="1.0" encoding="utf-8"?>
 <p:tagLst xmlns:a="http://schemas.openxmlformats.org/drawingml/2006/main" xmlns:r="http://schemas.openxmlformats.org/officeDocument/2006/relationships" xmlns:p="http://schemas.openxmlformats.org/presentationml/2006/main">
-  <p:tag name="ARTICULATE_SLIDE_THUMBNAIL_REFRESH" val="1"/>
+  <p:tag name="ARTICULATE_PROJECT_OPEN" val="0"/>
+  <p:tag name="ARTICULATE_SLIDE_COUNT" val="49"/>
 </p:tagLst>
 </file>
 
@@ -23575,6 +23481,12 @@
 </file>
 
 <file path=ppt/tags/tag11.xml><?xml version="1.0" encoding="utf-8"?>
+<p:tagLst xmlns:a="http://schemas.openxmlformats.org/drawingml/2006/main" xmlns:r="http://schemas.openxmlformats.org/officeDocument/2006/relationships" xmlns:p="http://schemas.openxmlformats.org/presentationml/2006/main">
+  <p:tag name="ARTICULATE_SLIDE_THUMBNAIL_REFRESH" val="1"/>
+</p:tagLst>
+</file>
+
+<file path=ppt/tags/tag12.xml><?xml version="1.0" encoding="utf-8"?>
 <p:tagLst xmlns:a="http://schemas.openxmlformats.org/drawingml/2006/main" xmlns:r="http://schemas.openxmlformats.org/officeDocument/2006/relationships" xmlns:p="http://schemas.openxmlformats.org/presentationml/2006/main">
   <p:tag name="ARTICULATE_SLIDE_THUMBNAIL_REFRESH" val="1"/>
 </p:tagLst>

</xml_diff>